<commit_message>
added lesson 4 slides
</commit_message>
<xml_diff>
--- a/slides/lesson4.pptx
+++ b/slides/lesson4.pptx
@@ -125,6 +125,11 @@
       </a:defRPr>
     </a:lvl9pPr>
   </p:defaultTextStyle>
+  <p:extLst>
+    <p:ext uri="{EFAFB233-063F-42B5-8137-9DF3F51BA10A}">
+      <p15:sldGuideLst xmlns:p15="http://schemas.microsoft.com/office/powerpoint/2012/main"/>
+    </p:ext>
+  </p:extLst>
 </p:presentation>
 </file>
 
@@ -17380,8 +17385,8 @@
               <a:buChar char="•"/>
             </a:pPr>
             <a:r>
-              <a:rPr lang="en-US" dirty="0" err="1"/>
-              <a:t>Chilllll</a:t>
+              <a:rPr lang="en-US"/>
+              <a:t>Chillllll</a:t>
             </a:r>
             <a:endParaRPr lang="en-SG" dirty="0"/>
           </a:p>

</xml_diff>

<commit_message>
Added example 5 solution
</commit_message>
<xml_diff>
--- a/slides/lesson4.pptx
+++ b/slides/lesson4.pptx
@@ -215,7 +215,7 @@
           <a:p>
             <a:fld id="{FA868041-E6F2-4756-A8BE-D4755162E464}" type="datetimeFigureOut">
               <a:rPr lang="en-SG" smtClean="0"/>
-              <a:t>3/8/2021</a:t>
+              <a:t>4/8/2021</a:t>
             </a:fld>
             <a:endParaRPr lang="en-SG"/>
           </a:p>
@@ -906,7 +906,7 @@
           <a:p>
             <a:fld id="{524C6359-9BB8-4148-8114-537E698DA205}" type="datetime1">
               <a:rPr lang="en-US" smtClean="0"/>
-              <a:t>8/3/2021</a:t>
+              <a:t>8/4/2021</a:t>
             </a:fld>
             <a:endParaRPr lang="en-US" dirty="0"/>
           </a:p>
@@ -1966,7 +1966,7 @@
           <a:p>
             <a:fld id="{A4649BD0-10DB-43E7-8F22-40B3D51B8FC3}" type="datetime1">
               <a:rPr lang="en-US" smtClean="0"/>
-              <a:t>8/3/2021</a:t>
+              <a:t>8/4/2021</a:t>
             </a:fld>
             <a:endParaRPr lang="en-US"/>
           </a:p>
@@ -3027,7 +3027,7 @@
           <a:p>
             <a:fld id="{0A16C79C-F566-427A-93F6-434A4E613134}" type="datetime1">
               <a:rPr lang="en-US" smtClean="0"/>
-              <a:t>8/3/2021</a:t>
+              <a:t>8/4/2021</a:t>
             </a:fld>
             <a:endParaRPr lang="en-US"/>
           </a:p>
@@ -4083,7 +4083,7 @@
           <a:p>
             <a:fld id="{9376191F-481E-48E9-BB9A-369A67A7362D}" type="datetime1">
               <a:rPr lang="en-US" smtClean="0"/>
-              <a:t>8/3/2021</a:t>
+              <a:t>8/4/2021</a:t>
             </a:fld>
             <a:endParaRPr lang="en-US" dirty="0"/>
           </a:p>
@@ -5212,7 +5212,7 @@
           <a:p>
             <a:fld id="{6C5677DE-DD04-48CC-9C18-7BE9FF2DEB6B}" type="datetime1">
               <a:rPr lang="en-US" smtClean="0"/>
-              <a:t>8/3/2021</a:t>
+              <a:t>8/4/2021</a:t>
             </a:fld>
             <a:endParaRPr lang="en-US"/>
           </a:p>
@@ -6331,7 +6331,7 @@
           <a:p>
             <a:fld id="{463255ED-7101-4D18-A8AE-3B5E4CB87EA5}" type="datetime1">
               <a:rPr lang="en-US" smtClean="0"/>
-              <a:t>8/3/2021</a:t>
+              <a:t>8/4/2021</a:t>
             </a:fld>
             <a:endParaRPr lang="en-US"/>
           </a:p>
@@ -7637,7 +7637,7 @@
           <a:p>
             <a:fld id="{CD52F23D-51F6-4C94-8CD5-B9ABBF67EE23}" type="datetime1">
               <a:rPr lang="en-US" smtClean="0"/>
-              <a:t>8/3/2021</a:t>
+              <a:t>8/4/2021</a:t>
             </a:fld>
             <a:endParaRPr lang="en-US"/>
           </a:p>
@@ -7784,7 +7784,7 @@
           <a:p>
             <a:fld id="{D51A702F-6367-4FD1-89A8-3744BE6BA9A2}" type="datetime1">
               <a:rPr lang="en-US" smtClean="0"/>
-              <a:t>8/3/2021</a:t>
+              <a:t>8/4/2021</a:t>
             </a:fld>
             <a:endParaRPr lang="en-US"/>
           </a:p>
@@ -8748,7 +8748,7 @@
           <a:p>
             <a:fld id="{4A6E99BD-4B4F-4460-B452-0E8146ACCF8F}" type="datetime1">
               <a:rPr lang="en-US" smtClean="0"/>
-              <a:t>8/3/2021</a:t>
+              <a:t>8/4/2021</a:t>
             </a:fld>
             <a:endParaRPr lang="en-US"/>
           </a:p>
@@ -9067,7 +9067,7 @@
           <a:p>
             <a:fld id="{EB6FD34C-1867-42A9-AC54-D15ADD8A65E7}" type="datetime1">
               <a:rPr lang="en-US" smtClean="0"/>
-              <a:t>8/3/2021</a:t>
+              <a:t>8/4/2021</a:t>
             </a:fld>
             <a:endParaRPr lang="en-US"/>
           </a:p>
@@ -10215,7 +10215,7 @@
           <a:p>
             <a:fld id="{336133E9-A654-4C17-8C3C-DDCAC83D6EBF}" type="datetime1">
               <a:rPr lang="en-US" smtClean="0"/>
-              <a:t>8/3/2021</a:t>
+              <a:t>8/4/2021</a:t>
             </a:fld>
             <a:endParaRPr lang="en-US"/>
           </a:p>
@@ -12625,7 +12625,7 @@
           <a:p>
             <a:fld id="{8769D389-4C4C-4FD7-9E6B-9F44477F0EB8}" type="datetime1">
               <a:rPr lang="en-US" smtClean="0"/>
-              <a:t>8/3/2021</a:t>
+              <a:t>8/4/2021</a:t>
             </a:fld>
             <a:endParaRPr lang="en-US" dirty="0"/>
           </a:p>
@@ -17812,8 +17812,13 @@
             <a:pPr lvl="1"/>
             <a:r>
               <a:rPr lang="en-SG" dirty="0"/>
-              <a:t>Instead of “password”, we store “5e884898da28047151d0e56f8dc6292773603d0d6aabbdd62a11ef721d1542d8”</a:t>
+              <a:t>Instead of “password”, we store “</a:t>
             </a:r>
+            <a:r>
+              <a:rPr lang="en-SG"/>
+              <a:t>5e884898da28047151d0e56f8dc6292773603d0d6aabbdd62a11ef721d1542d8”</a:t>
+            </a:r>
+            <a:endParaRPr lang="en-SG" dirty="0"/>
           </a:p>
           <a:p>
             <a:r>

</xml_diff>